<commit_message>
Removed Arne's PhD title for now :(
</commit_message>
<xml_diff>
--- a/Emerging-Technologies-for-the-Circular-Economy/ETCE-L05b-IoT-Security-and-Privacy.pptx
+++ b/Emerging-Technologies-for-the-Circular-Economy/ETCE-L05b-IoT-Security-and-Privacy.pptx
@@ -319,7 +319,7 @@
             <a:pPr algn="r">
               <a:buNone/>
             </a:pPr>
-            <a:fld id="{DA4FC587-70C2-48F9-8FB3-28C1BA8A7C7F}" type="slidenum">
+            <a:fld id="{D121A255-617F-49C7-B619-F868D80BF14A}" type="slidenum">
               <a:rPr b="0" lang="en-US" sz="1400" spc="-1" strike="noStrike">
                 <a:latin typeface="DejaVu Serif"/>
               </a:rPr>
@@ -367,7 +367,7 @@
         <p:spPr>
           <a:xfrm>
             <a:off x="90360" y="744480"/>
-            <a:ext cx="6613560" cy="3719520"/>
+            <a:ext cx="6613200" cy="3719160"/>
           </a:xfrm>
           <a:prstGeom prst="rect">
             <a:avLst/>
@@ -390,7 +390,7 @@
         <p:spPr>
           <a:xfrm>
             <a:off x="679680" y="4715280"/>
-            <a:ext cx="5434560" cy="4463280"/>
+            <a:ext cx="5434200" cy="4462920"/>
           </a:xfrm>
           <a:prstGeom prst="rect">
             <a:avLst/>
@@ -420,7 +420,7 @@
         <p:spPr>
           <a:xfrm>
             <a:off x="3850560" y="9428760"/>
-            <a:ext cx="2941920" cy="492840"/>
+            <a:ext cx="2941560" cy="492480"/>
           </a:xfrm>
           <a:prstGeom prst="rect">
             <a:avLst/>
@@ -447,7 +447,7 @@
               </a:lnSpc>
               <a:buNone/>
             </a:pPr>
-            <a:fld id="{207FE310-FE33-4490-93B7-68B43F3D0546}" type="slidenum">
+            <a:fld id="{4A7E46FE-8677-4287-9052-DED894ED3DBC}" type="slidenum">
               <a:rPr b="0" lang="de-DE" sz="1300" spc="-1" strike="noStrike">
                 <a:solidFill>
                   <a:srgbClr val="000000"/>
@@ -5073,7 +5073,7 @@
         <p:spPr>
           <a:xfrm>
             <a:off x="11444760" y="0"/>
-            <a:ext cx="745560" cy="6854400"/>
+            <a:ext cx="745200" cy="6854040"/>
           </a:xfrm>
           <a:prstGeom prst="rect">
             <a:avLst/>
@@ -5103,7 +5103,7 @@
         <p:spPr>
           <a:xfrm>
             <a:off x="11438640" y="6453360"/>
-            <a:ext cx="762480" cy="400680"/>
+            <a:ext cx="762120" cy="400680"/>
           </a:xfrm>
           <a:prstGeom prst="rect">
             <a:avLst/>
@@ -5130,7 +5130,7 @@
               </a:lnSpc>
               <a:buNone/>
             </a:pPr>
-            <a:fld id="{E7D36B9C-AA58-4A47-A0CB-DF05D334BED1}" type="slidenum">
+            <a:fld id="{706F848C-C0C6-4DA0-A128-D54D2041523C}" type="slidenum">
               <a:rPr b="0" lang="de-DE" sz="1800" spc="-1" strike="noStrike">
                 <a:solidFill>
                   <a:srgbClr val="808080"/>
@@ -5155,7 +5155,7 @@
         <p:spPr>
           <a:xfrm>
             <a:off x="912240" y="1268280"/>
-            <a:ext cx="9212400" cy="365760"/>
+            <a:ext cx="9212040" cy="365400"/>
           </a:xfrm>
           <a:prstGeom prst="rect">
             <a:avLst/>
@@ -5185,7 +5185,7 @@
         <p:spPr>
           <a:xfrm>
             <a:off x="0" y="0"/>
-            <a:ext cx="3056400" cy="566280"/>
+            <a:ext cx="3056040" cy="565920"/>
           </a:xfrm>
           <a:prstGeom prst="rect">
             <a:avLst/>
@@ -5208,7 +5208,7 @@
         <p:spPr>
           <a:xfrm>
             <a:off x="7430400" y="134640"/>
-            <a:ext cx="3702240" cy="518400"/>
+            <a:ext cx="3701880" cy="518040"/>
           </a:xfrm>
           <a:prstGeom prst="rect">
             <a:avLst/>
@@ -5227,7 +5227,7 @@
         <p:spPr>
           <a:xfrm>
             <a:off x="912240" y="1268280"/>
-            <a:ext cx="9212400" cy="365760"/>
+            <a:ext cx="9212040" cy="365400"/>
           </a:xfrm>
           <a:prstGeom prst="rect">
             <a:avLst/>
@@ -5253,7 +5253,7 @@
         <p:spPr>
           <a:xfrm>
             <a:off x="11444760" y="0"/>
-            <a:ext cx="745560" cy="6854400"/>
+            <a:ext cx="745200" cy="6854040"/>
           </a:xfrm>
           <a:prstGeom prst="rect">
             <a:avLst/>
@@ -5283,7 +5283,7 @@
         <p:spPr>
           <a:xfrm>
             <a:off x="0" y="6642720"/>
-            <a:ext cx="12186720" cy="211320"/>
+            <a:ext cx="12186360" cy="211320"/>
           </a:xfrm>
           <a:prstGeom prst="rect">
             <a:avLst/>
@@ -5625,7 +5625,7 @@
         <p:spPr>
           <a:xfrm>
             <a:off x="11444760" y="0"/>
-            <a:ext cx="745560" cy="6854400"/>
+            <a:ext cx="745200" cy="6854040"/>
           </a:xfrm>
           <a:prstGeom prst="rect">
             <a:avLst/>
@@ -5655,7 +5655,7 @@
         <p:spPr>
           <a:xfrm>
             <a:off x="11438640" y="6453360"/>
-            <a:ext cx="762480" cy="400680"/>
+            <a:ext cx="762120" cy="400680"/>
           </a:xfrm>
           <a:prstGeom prst="rect">
             <a:avLst/>
@@ -5682,7 +5682,7 @@
               </a:lnSpc>
               <a:buNone/>
             </a:pPr>
-            <a:fld id="{A7BC578C-46EE-4804-A94D-744F7E4BB94E}" type="slidenum">
+            <a:fld id="{0BAC96BE-6A4E-4BA4-AE4A-421402A56DE5}" type="slidenum">
               <a:rPr b="0" lang="de-DE" sz="1800" spc="-1" strike="noStrike">
                 <a:solidFill>
                   <a:srgbClr val="808080"/>
@@ -5707,7 +5707,7 @@
         <p:spPr>
           <a:xfrm>
             <a:off x="912240" y="1268280"/>
-            <a:ext cx="9212400" cy="365760"/>
+            <a:ext cx="9212040" cy="365400"/>
           </a:xfrm>
           <a:prstGeom prst="rect">
             <a:avLst/>
@@ -5737,7 +5737,7 @@
         <p:spPr>
           <a:xfrm>
             <a:off x="0" y="0"/>
-            <a:ext cx="3056400" cy="566280"/>
+            <a:ext cx="3056040" cy="565920"/>
           </a:xfrm>
           <a:prstGeom prst="rect">
             <a:avLst/>
@@ -5760,7 +5760,7 @@
         <p:spPr>
           <a:xfrm>
             <a:off x="7430400" y="134640"/>
-            <a:ext cx="3702240" cy="518400"/>
+            <a:ext cx="3701880" cy="518040"/>
           </a:xfrm>
           <a:prstGeom prst="rect">
             <a:avLst/>
@@ -5779,7 +5779,7 @@
         <p:spPr>
           <a:xfrm>
             <a:off x="11444760" y="0"/>
-            <a:ext cx="745560" cy="6854400"/>
+            <a:ext cx="745200" cy="6854040"/>
           </a:xfrm>
           <a:prstGeom prst="rect">
             <a:avLst/>
@@ -5809,7 +5809,7 @@
         <p:spPr>
           <a:xfrm>
             <a:off x="11438640" y="6453360"/>
-            <a:ext cx="762480" cy="400680"/>
+            <a:ext cx="762120" cy="400680"/>
           </a:xfrm>
           <a:prstGeom prst="rect">
             <a:avLst/>
@@ -5836,7 +5836,7 @@
               </a:lnSpc>
               <a:buNone/>
             </a:pPr>
-            <a:fld id="{1DE22087-3F31-4016-A79B-3F4C75824F5C}" type="slidenum">
+            <a:fld id="{F042DCF8-BE80-46FB-9AF8-A077AF0D74E6}" type="slidenum">
               <a:rPr b="0" lang="de-DE" sz="1800" spc="-1" strike="noStrike">
                 <a:solidFill>
                   <a:srgbClr val="808080"/>
@@ -5861,7 +5861,7 @@
         <p:spPr>
           <a:xfrm>
             <a:off x="0" y="6642720"/>
-            <a:ext cx="12186720" cy="211320"/>
+            <a:ext cx="12186360" cy="211320"/>
           </a:xfrm>
           <a:prstGeom prst="rect">
             <a:avLst/>
@@ -6203,7 +6203,7 @@
         <p:spPr>
           <a:xfrm>
             <a:off x="11444760" y="0"/>
-            <a:ext cx="745560" cy="6854400"/>
+            <a:ext cx="745200" cy="6854040"/>
           </a:xfrm>
           <a:prstGeom prst="rect">
             <a:avLst/>
@@ -6233,7 +6233,7 @@
         <p:spPr>
           <a:xfrm>
             <a:off x="11438640" y="6453360"/>
-            <a:ext cx="762480" cy="400680"/>
+            <a:ext cx="762120" cy="400680"/>
           </a:xfrm>
           <a:prstGeom prst="rect">
             <a:avLst/>
@@ -6260,7 +6260,7 @@
               </a:lnSpc>
               <a:buNone/>
             </a:pPr>
-            <a:fld id="{293C4AB5-DF54-4CE9-822B-360F1C2DFDB5}" type="slidenum">
+            <a:fld id="{1952B5E9-7365-4D08-9693-B2C39F7D30A0}" type="slidenum">
               <a:rPr b="0" lang="de-DE" sz="1800" spc="-1" strike="noStrike">
                 <a:solidFill>
                   <a:srgbClr val="808080"/>
@@ -6285,7 +6285,7 @@
         <p:spPr>
           <a:xfrm>
             <a:off x="912240" y="1268280"/>
-            <a:ext cx="9212400" cy="365760"/>
+            <a:ext cx="9212040" cy="365400"/>
           </a:xfrm>
           <a:prstGeom prst="rect">
             <a:avLst/>
@@ -6315,7 +6315,7 @@
         <p:spPr>
           <a:xfrm>
             <a:off x="0" y="0"/>
-            <a:ext cx="3056400" cy="566280"/>
+            <a:ext cx="3056040" cy="565920"/>
           </a:xfrm>
           <a:prstGeom prst="rect">
             <a:avLst/>
@@ -6338,7 +6338,7 @@
         <p:spPr>
           <a:xfrm>
             <a:off x="7430400" y="134640"/>
-            <a:ext cx="3702240" cy="518400"/>
+            <a:ext cx="3701880" cy="518040"/>
           </a:xfrm>
           <a:prstGeom prst="rect">
             <a:avLst/>
@@ -6357,7 +6357,7 @@
         <p:spPr>
           <a:xfrm>
             <a:off x="11444760" y="0"/>
-            <a:ext cx="745560" cy="6854400"/>
+            <a:ext cx="745200" cy="6854040"/>
           </a:xfrm>
           <a:prstGeom prst="rect">
             <a:avLst/>
@@ -6387,7 +6387,7 @@
         <p:spPr>
           <a:xfrm>
             <a:off x="11438640" y="6453360"/>
-            <a:ext cx="762480" cy="400680"/>
+            <a:ext cx="762120" cy="400680"/>
           </a:xfrm>
           <a:prstGeom prst="rect">
             <a:avLst/>
@@ -6414,7 +6414,7 @@
               </a:lnSpc>
               <a:buNone/>
             </a:pPr>
-            <a:fld id="{B6C86C00-3094-4E9F-9848-EE3E81AF2795}" type="slidenum">
+            <a:fld id="{679D3420-C13A-4823-BA9D-5032E5DE08E2}" type="slidenum">
               <a:rPr b="0" lang="de-DE" sz="1800" spc="-1" strike="noStrike">
                 <a:solidFill>
                   <a:srgbClr val="808080"/>
@@ -6439,7 +6439,7 @@
         <p:spPr>
           <a:xfrm>
             <a:off x="0" y="6642720"/>
-            <a:ext cx="12186720" cy="211320"/>
+            <a:ext cx="12186360" cy="211320"/>
           </a:xfrm>
           <a:prstGeom prst="rect">
             <a:avLst/>
@@ -6774,7 +6774,7 @@
         <p:spPr>
           <a:xfrm>
             <a:off x="527400" y="1412640"/>
-            <a:ext cx="10365480" cy="1152000"/>
+            <a:ext cx="10365120" cy="1151640"/>
           </a:xfrm>
           <a:prstGeom prst="rect">
             <a:avLst/>
@@ -6826,7 +6826,7 @@
         <p:spPr>
           <a:xfrm>
             <a:off x="527400" y="2852640"/>
-            <a:ext cx="10365480" cy="2372760"/>
+            <a:ext cx="10365120" cy="2372400"/>
           </a:xfrm>
           <a:prstGeom prst="rect">
             <a:avLst/>
@@ -6972,7 +6972,7 @@
                 <a:latin typeface="DejaVu Sans"/>
                 <a:ea typeface="DejaVu Sans"/>
               </a:rPr>
-              <a:t>Dr. Arne Bochem (Göttingen)</a:t>
+              <a:t>M.Sc. Arne Bochem (Göttingen)</a:t>
             </a:r>
             <a:endParaRPr b="0" lang="en-US" sz="1600" spc="-1" strike="noStrike">
               <a:latin typeface="DejaVu Sans"/>
@@ -7073,7 +7073,7 @@
         <p:spPr>
           <a:xfrm>
             <a:off x="335520" y="764640"/>
-            <a:ext cx="10749600" cy="500400"/>
+            <a:ext cx="10749240" cy="500040"/>
           </a:xfrm>
           <a:prstGeom prst="rect">
             <a:avLst/>
@@ -7125,7 +7125,7 @@
         <p:spPr>
           <a:xfrm>
             <a:off x="263520" y="6411600"/>
-            <a:ext cx="7253280" cy="226800"/>
+            <a:ext cx="7252920" cy="226800"/>
           </a:xfrm>
           <a:prstGeom prst="rect">
             <a:avLst/>
@@ -7177,7 +7177,7 @@
         <p:spPr>
           <a:xfrm>
             <a:off x="335520" y="1268640"/>
-            <a:ext cx="10750320" cy="5037840"/>
+            <a:ext cx="10749960" cy="5037480"/>
           </a:xfrm>
           <a:prstGeom prst="rect">
             <a:avLst/>
@@ -7363,7 +7363,7 @@
         <p:spPr>
           <a:xfrm>
             <a:off x="335520" y="764640"/>
-            <a:ext cx="10749600" cy="500400"/>
+            <a:ext cx="10749240" cy="500040"/>
           </a:xfrm>
           <a:prstGeom prst="rect">
             <a:avLst/>
@@ -7415,7 +7415,7 @@
         <p:spPr>
           <a:xfrm>
             <a:off x="263520" y="6411600"/>
-            <a:ext cx="7253280" cy="226800"/>
+            <a:ext cx="7252920" cy="226800"/>
           </a:xfrm>
           <a:prstGeom prst="rect">
             <a:avLst/>
@@ -7467,7 +7467,7 @@
         <p:spPr>
           <a:xfrm>
             <a:off x="335520" y="1268640"/>
-            <a:ext cx="10750320" cy="5037840"/>
+            <a:ext cx="10749960" cy="5037480"/>
           </a:xfrm>
           <a:prstGeom prst="rect">
             <a:avLst/>
@@ -7658,7 +7658,7 @@
         <p:spPr>
           <a:xfrm>
             <a:off x="335520" y="764640"/>
-            <a:ext cx="10749600" cy="500400"/>
+            <a:ext cx="10749240" cy="500040"/>
           </a:xfrm>
           <a:prstGeom prst="rect">
             <a:avLst/>
@@ -7710,7 +7710,7 @@
         <p:spPr>
           <a:xfrm>
             <a:off x="263520" y="6411600"/>
-            <a:ext cx="7253280" cy="226800"/>
+            <a:ext cx="7252920" cy="226800"/>
           </a:xfrm>
           <a:prstGeom prst="rect">
             <a:avLst/>
@@ -7762,7 +7762,7 @@
         <p:spPr>
           <a:xfrm>
             <a:off x="335520" y="1268640"/>
-            <a:ext cx="10750320" cy="5037840"/>
+            <a:ext cx="10749960" cy="5037480"/>
           </a:xfrm>
           <a:prstGeom prst="rect">
             <a:avLst/>
@@ -7958,7 +7958,7 @@
         <p:spPr>
           <a:xfrm>
             <a:off x="335520" y="764640"/>
-            <a:ext cx="10749600" cy="500400"/>
+            <a:ext cx="10749240" cy="500040"/>
           </a:xfrm>
           <a:prstGeom prst="rect">
             <a:avLst/>
@@ -8010,7 +8010,7 @@
         <p:spPr>
           <a:xfrm>
             <a:off x="263520" y="6411600"/>
-            <a:ext cx="7253280" cy="226800"/>
+            <a:ext cx="7252920" cy="226800"/>
           </a:xfrm>
           <a:prstGeom prst="rect">
             <a:avLst/>
@@ -8062,7 +8062,7 @@
         <p:spPr>
           <a:xfrm>
             <a:off x="335520" y="1268640"/>
-            <a:ext cx="10750320" cy="5037840"/>
+            <a:ext cx="10749960" cy="5037480"/>
           </a:xfrm>
           <a:prstGeom prst="rect">
             <a:avLst/>
@@ -8268,7 +8268,7 @@
         <p:spPr>
           <a:xfrm>
             <a:off x="335520" y="764640"/>
-            <a:ext cx="10750320" cy="501120"/>
+            <a:ext cx="10749960" cy="500760"/>
           </a:xfrm>
           <a:prstGeom prst="rect">
             <a:avLst/>
@@ -8320,7 +8320,7 @@
         <p:spPr>
           <a:xfrm>
             <a:off x="335520" y="1268640"/>
-            <a:ext cx="10750320" cy="5037840"/>
+            <a:ext cx="10749960" cy="5037480"/>
           </a:xfrm>
           <a:prstGeom prst="rect">
             <a:avLst/>
@@ -8444,7 +8444,7 @@
         <p:spPr>
           <a:xfrm>
             <a:off x="335520" y="4406760"/>
-            <a:ext cx="10749600" cy="1358640"/>
+            <a:ext cx="10749240" cy="1358280"/>
           </a:xfrm>
           <a:prstGeom prst="rect">
             <a:avLst/>
@@ -8496,7 +8496,7 @@
         <p:spPr>
           <a:xfrm>
             <a:off x="335520" y="2906640"/>
-            <a:ext cx="10749600" cy="1496520"/>
+            <a:ext cx="10749240" cy="1496160"/>
           </a:xfrm>
           <a:prstGeom prst="rect">
             <a:avLst/>
@@ -8552,7 +8552,7 @@
         <p:spPr>
           <a:xfrm>
             <a:off x="335520" y="764640"/>
-            <a:ext cx="10750320" cy="501120"/>
+            <a:ext cx="10749960" cy="500760"/>
           </a:xfrm>
           <a:prstGeom prst="rect">
             <a:avLst/>
@@ -8604,7 +8604,7 @@
         <p:spPr>
           <a:xfrm>
             <a:off x="335520" y="1268640"/>
-            <a:ext cx="10750320" cy="5037840"/>
+            <a:ext cx="10749960" cy="5037480"/>
           </a:xfrm>
           <a:prstGeom prst="rect">
             <a:avLst/>
@@ -8780,7 +8780,7 @@
         <p:spPr>
           <a:xfrm>
             <a:off x="263520" y="6411600"/>
-            <a:ext cx="8972280" cy="226800"/>
+            <a:ext cx="8971920" cy="226800"/>
           </a:xfrm>
           <a:prstGeom prst="rect">
             <a:avLst/>
@@ -8862,7 +8862,7 @@
         <p:spPr>
           <a:xfrm>
             <a:off x="335520" y="764640"/>
-            <a:ext cx="10750320" cy="501120"/>
+            <a:ext cx="10749960" cy="500760"/>
           </a:xfrm>
           <a:prstGeom prst="rect">
             <a:avLst/>
@@ -8914,7 +8914,7 @@
         <p:spPr>
           <a:xfrm>
             <a:off x="335520" y="1268640"/>
-            <a:ext cx="10750320" cy="5037840"/>
+            <a:ext cx="10749960" cy="5037480"/>
           </a:xfrm>
           <a:prstGeom prst="rect">
             <a:avLst/>
@@ -9041,7 +9041,7 @@
         <p:spPr>
           <a:xfrm>
             <a:off x="263520" y="6411600"/>
-            <a:ext cx="8972280" cy="226800"/>
+            <a:ext cx="8971920" cy="226800"/>
           </a:xfrm>
           <a:prstGeom prst="rect">
             <a:avLst/>
@@ -9123,7 +9123,7 @@
         <p:spPr>
           <a:xfrm>
             <a:off x="335520" y="764640"/>
-            <a:ext cx="10750320" cy="501120"/>
+            <a:ext cx="10749960" cy="500760"/>
           </a:xfrm>
           <a:prstGeom prst="rect">
             <a:avLst/>
@@ -9175,7 +9175,7 @@
         <p:spPr>
           <a:xfrm>
             <a:off x="335520" y="1268640"/>
-            <a:ext cx="10750320" cy="5037840"/>
+            <a:ext cx="10749960" cy="5037480"/>
           </a:xfrm>
           <a:prstGeom prst="rect">
             <a:avLst/>
@@ -9452,7 +9452,7 @@
         <p:spPr>
           <a:xfrm>
             <a:off x="263520" y="6411600"/>
-            <a:ext cx="8972280" cy="226800"/>
+            <a:ext cx="8971920" cy="226800"/>
           </a:xfrm>
           <a:prstGeom prst="rect">
             <a:avLst/>
@@ -9534,7 +9534,7 @@
         <p:spPr>
           <a:xfrm>
             <a:off x="335520" y="764640"/>
-            <a:ext cx="10750320" cy="501120"/>
+            <a:ext cx="10749960" cy="500760"/>
           </a:xfrm>
           <a:prstGeom prst="rect">
             <a:avLst/>
@@ -9586,7 +9586,7 @@
         <p:spPr>
           <a:xfrm>
             <a:off x="335520" y="1268640"/>
-            <a:ext cx="10750320" cy="5037840"/>
+            <a:ext cx="10749960" cy="5037480"/>
           </a:xfrm>
           <a:prstGeom prst="rect">
             <a:avLst/>
@@ -9742,7 +9742,7 @@
         <p:spPr>
           <a:xfrm>
             <a:off x="263520" y="6411600"/>
-            <a:ext cx="8972280" cy="226800"/>
+            <a:ext cx="8971920" cy="226800"/>
           </a:xfrm>
           <a:prstGeom prst="rect">
             <a:avLst/>
@@ -9824,7 +9824,7 @@
         <p:spPr>
           <a:xfrm>
             <a:off x="335520" y="764640"/>
-            <a:ext cx="10739880" cy="490680"/>
+            <a:ext cx="10739520" cy="490320"/>
           </a:xfrm>
           <a:prstGeom prst="rect">
             <a:avLst/>
@@ -9876,7 +9876,7 @@
         <p:spPr>
           <a:xfrm>
             <a:off x="335520" y="1268280"/>
-            <a:ext cx="10739880" cy="5027400"/>
+            <a:ext cx="10739520" cy="5027040"/>
           </a:xfrm>
           <a:prstGeom prst="rect">
             <a:avLst/>
@@ -10098,7 +10098,7 @@
         <p:spPr>
           <a:xfrm>
             <a:off x="335520" y="764640"/>
-            <a:ext cx="10750320" cy="501120"/>
+            <a:ext cx="10749960" cy="500760"/>
           </a:xfrm>
           <a:prstGeom prst="rect">
             <a:avLst/>
@@ -10150,7 +10150,7 @@
         <p:spPr>
           <a:xfrm>
             <a:off x="335520" y="1268640"/>
-            <a:ext cx="10750320" cy="5037840"/>
+            <a:ext cx="10749960" cy="5037480"/>
           </a:xfrm>
           <a:prstGeom prst="rect">
             <a:avLst/>
@@ -10278,7 +10278,7 @@
         <p:spPr>
           <a:xfrm>
             <a:off x="335520" y="4406760"/>
-            <a:ext cx="10749600" cy="1358640"/>
+            <a:ext cx="10749240" cy="1358280"/>
           </a:xfrm>
           <a:prstGeom prst="rect">
             <a:avLst/>
@@ -10330,7 +10330,7 @@
         <p:spPr>
           <a:xfrm>
             <a:off x="335520" y="2906640"/>
-            <a:ext cx="10749600" cy="1496520"/>
+            <a:ext cx="10749240" cy="1496160"/>
           </a:xfrm>
           <a:prstGeom prst="rect">
             <a:avLst/>
@@ -10386,7 +10386,7 @@
         <p:spPr>
           <a:xfrm>
             <a:off x="335520" y="764640"/>
-            <a:ext cx="10750320" cy="501120"/>
+            <a:ext cx="10749960" cy="500760"/>
           </a:xfrm>
           <a:prstGeom prst="rect">
             <a:avLst/>
@@ -10438,7 +10438,7 @@
         <p:spPr>
           <a:xfrm>
             <a:off x="335520" y="1268640"/>
-            <a:ext cx="10750320" cy="5037840"/>
+            <a:ext cx="10749960" cy="5037480"/>
           </a:xfrm>
           <a:prstGeom prst="rect">
             <a:avLst/>
@@ -10818,7 +10818,7 @@
         <p:spPr>
           <a:xfrm>
             <a:off x="335520" y="764640"/>
-            <a:ext cx="10750320" cy="501120"/>
+            <a:ext cx="10749960" cy="500760"/>
           </a:xfrm>
           <a:prstGeom prst="rect">
             <a:avLst/>
@@ -10870,7 +10870,7 @@
         <p:spPr>
           <a:xfrm>
             <a:off x="335520" y="1268640"/>
-            <a:ext cx="10750320" cy="5037840"/>
+            <a:ext cx="10749960" cy="5037480"/>
           </a:xfrm>
           <a:prstGeom prst="rect">
             <a:avLst/>
@@ -11134,7 +11134,7 @@
         <p:spPr>
           <a:xfrm>
             <a:off x="335520" y="764640"/>
-            <a:ext cx="10750320" cy="501120"/>
+            <a:ext cx="10749960" cy="500760"/>
           </a:xfrm>
           <a:prstGeom prst="rect">
             <a:avLst/>
@@ -11186,7 +11186,7 @@
         <p:spPr>
           <a:xfrm>
             <a:off x="335520" y="1268640"/>
-            <a:ext cx="10750320" cy="5037840"/>
+            <a:ext cx="10749960" cy="5037480"/>
           </a:xfrm>
           <a:prstGeom prst="rect">
             <a:avLst/>
@@ -11481,7 +11481,7 @@
         <p:spPr>
           <a:xfrm>
             <a:off x="7289640" y="840960"/>
-            <a:ext cx="3772440" cy="2265840"/>
+            <a:ext cx="3772080" cy="2265480"/>
           </a:xfrm>
           <a:prstGeom prst="rect">
             <a:avLst/>
@@ -11504,7 +11504,7 @@
         <p:spPr>
           <a:xfrm>
             <a:off x="7315200" y="3291840"/>
-            <a:ext cx="3801600" cy="2307960"/>
+            <a:ext cx="3801240" cy="2307600"/>
           </a:xfrm>
           <a:prstGeom prst="rect">
             <a:avLst/>
@@ -11523,7 +11523,7 @@
         <p:spPr>
           <a:xfrm>
             <a:off x="7772400" y="5669280"/>
-            <a:ext cx="3209040" cy="226800"/>
+            <a:ext cx="3208680" cy="226800"/>
           </a:xfrm>
           <a:prstGeom prst="rect">
             <a:avLst/>
@@ -11575,7 +11575,7 @@
         <p:spPr>
           <a:xfrm>
             <a:off x="263520" y="6411600"/>
-            <a:ext cx="10891440" cy="382320"/>
+            <a:ext cx="10891080" cy="382320"/>
           </a:xfrm>
           <a:prstGeom prst="rect">
             <a:avLst/>
@@ -11669,7 +11669,7 @@
         <p:spPr>
           <a:xfrm>
             <a:off x="335520" y="764640"/>
-            <a:ext cx="10750320" cy="501120"/>
+            <a:ext cx="10749960" cy="500760"/>
           </a:xfrm>
           <a:prstGeom prst="rect">
             <a:avLst/>
@@ -11721,7 +11721,7 @@
         <p:spPr>
           <a:xfrm>
             <a:off x="335520" y="1268640"/>
-            <a:ext cx="10750320" cy="5037840"/>
+            <a:ext cx="10749960" cy="5037480"/>
           </a:xfrm>
           <a:prstGeom prst="rect">
             <a:avLst/>
@@ -12014,7 +12014,7 @@
         <p:spPr>
           <a:xfrm>
             <a:off x="335520" y="1268640"/>
-            <a:ext cx="10749600" cy="5037120"/>
+            <a:ext cx="10749240" cy="5036760"/>
           </a:xfrm>
           <a:prstGeom prst="rect">
             <a:avLst/>
@@ -12072,7 +12072,7 @@
         <p:spPr>
           <a:xfrm>
             <a:off x="335520" y="764640"/>
-            <a:ext cx="10749600" cy="500400"/>
+            <a:ext cx="10749240" cy="500040"/>
           </a:xfrm>
           <a:prstGeom prst="rect">
             <a:avLst/>
@@ -12128,7 +12128,7 @@
         <p:spPr>
           <a:xfrm>
             <a:off x="335520" y="4406760"/>
-            <a:ext cx="10749600" cy="1358640"/>
+            <a:ext cx="10749240" cy="1358280"/>
           </a:xfrm>
           <a:prstGeom prst="rect">
             <a:avLst/>
@@ -12180,7 +12180,7 @@
         <p:spPr>
           <a:xfrm>
             <a:off x="335520" y="2906640"/>
-            <a:ext cx="10749600" cy="1496520"/>
+            <a:ext cx="10749240" cy="1496160"/>
           </a:xfrm>
           <a:prstGeom prst="rect">
             <a:avLst/>
@@ -12236,7 +12236,7 @@
         <p:spPr>
           <a:xfrm>
             <a:off x="335520" y="764640"/>
-            <a:ext cx="10749600" cy="500400"/>
+            <a:ext cx="10749240" cy="500040"/>
           </a:xfrm>
           <a:prstGeom prst="rect">
             <a:avLst/>
@@ -12292,7 +12292,7 @@
         <p:spPr>
           <a:xfrm>
             <a:off x="727560" y="2110320"/>
-            <a:ext cx="9965520" cy="3687120"/>
+            <a:ext cx="9965160" cy="3686760"/>
           </a:xfrm>
           <a:prstGeom prst="rect">
             <a:avLst/>
@@ -12341,7 +12341,7 @@
         <p:spPr>
           <a:xfrm>
             <a:off x="335520" y="764640"/>
-            <a:ext cx="10749600" cy="500400"/>
+            <a:ext cx="10749240" cy="500040"/>
           </a:xfrm>
           <a:prstGeom prst="rect">
             <a:avLst/>
@@ -12397,7 +12397,7 @@
         <p:spPr>
           <a:xfrm>
             <a:off x="1097280" y="1265760"/>
-            <a:ext cx="9051840" cy="5100120"/>
+            <a:ext cx="9051480" cy="5099760"/>
           </a:xfrm>
           <a:prstGeom prst="rect">
             <a:avLst/>
@@ -12416,7 +12416,7 @@
         <p:spPr>
           <a:xfrm>
             <a:off x="263520" y="6411600"/>
-            <a:ext cx="9977040" cy="245160"/>
+            <a:ext cx="9976680" cy="245160"/>
           </a:xfrm>
           <a:prstGeom prst="rect">
             <a:avLst/>
@@ -12510,7 +12510,7 @@
         <p:spPr>
           <a:xfrm>
             <a:off x="335520" y="764640"/>
-            <a:ext cx="10749600" cy="500400"/>
+            <a:ext cx="10749240" cy="500040"/>
           </a:xfrm>
           <a:prstGeom prst="rect">
             <a:avLst/>
@@ -12566,7 +12566,7 @@
         <p:spPr>
           <a:xfrm>
             <a:off x="745560" y="1884600"/>
-            <a:ext cx="10058040" cy="4203000"/>
+            <a:ext cx="10057680" cy="4202640"/>
           </a:xfrm>
           <a:prstGeom prst="rect">
             <a:avLst/>
@@ -12615,7 +12615,7 @@
         <p:spPr>
           <a:xfrm>
             <a:off x="335520" y="764640"/>
-            <a:ext cx="10750320" cy="501120"/>
+            <a:ext cx="10749960" cy="500760"/>
           </a:xfrm>
           <a:prstGeom prst="rect">
             <a:avLst/>
@@ -12667,7 +12667,7 @@
         <p:spPr>
           <a:xfrm>
             <a:off x="335520" y="1268640"/>
-            <a:ext cx="10750320" cy="5037840"/>
+            <a:ext cx="10749960" cy="5037480"/>
           </a:xfrm>
           <a:prstGeom prst="rect">
             <a:avLst/>
@@ -12897,7 +12897,7 @@
         <p:spPr>
           <a:xfrm>
             <a:off x="335520" y="764640"/>
-            <a:ext cx="10749600" cy="500400"/>
+            <a:ext cx="10749240" cy="500040"/>
           </a:xfrm>
           <a:prstGeom prst="rect">
             <a:avLst/>
@@ -12949,7 +12949,7 @@
         <p:spPr>
           <a:xfrm>
             <a:off x="263520" y="6411600"/>
-            <a:ext cx="9977040" cy="245160"/>
+            <a:ext cx="9976680" cy="245160"/>
           </a:xfrm>
           <a:prstGeom prst="rect">
             <a:avLst/>
@@ -13017,7 +13017,7 @@
         <p:spPr>
           <a:xfrm>
             <a:off x="1463040" y="1371600"/>
-            <a:ext cx="8632080" cy="4942800"/>
+            <a:ext cx="8631720" cy="4942440"/>
           </a:xfrm>
           <a:prstGeom prst="rect">
             <a:avLst/>
@@ -13066,7 +13066,7 @@
         <p:spPr>
           <a:xfrm>
             <a:off x="335520" y="764640"/>
-            <a:ext cx="10749600" cy="500400"/>
+            <a:ext cx="10749240" cy="500040"/>
           </a:xfrm>
           <a:prstGeom prst="rect">
             <a:avLst/>
@@ -13118,7 +13118,7 @@
         <p:spPr>
           <a:xfrm>
             <a:off x="263520" y="6411600"/>
-            <a:ext cx="7253280" cy="226800"/>
+            <a:ext cx="7252920" cy="226800"/>
           </a:xfrm>
           <a:prstGeom prst="rect">
             <a:avLst/>

</xml_diff>

<commit_message>
+ added ETCE E05 exercise * updated ETCE L05
</commit_message>
<xml_diff>
--- a/Emerging-Technologies-for-the-Circular-Economy/ETCE-L05b-IoT-Security-and-Privacy.pptx
+++ b/Emerging-Technologies-for-the-Circular-Economy/ETCE-L05b-IoT-Security-and-Privacy.pptx
@@ -370,7 +370,7 @@
             <a:pPr indent="0" algn="r">
               <a:buNone/>
             </a:pPr>
-            <a:fld id="{AF64614F-15BE-4208-9DCD-4E97BC4FDD72}" type="slidenum">
+            <a:fld id="{5AB0CC6D-9554-4761-AF30-B1DBC5531E0C}" type="slidenum">
               <a:rPr b="0" lang="en-GB" sz="1400" spc="-1" strike="noStrike">
                 <a:solidFill>
                   <a:srgbClr val="000000"/>
@@ -424,7 +424,7 @@
         <p:spPr>
           <a:xfrm>
             <a:off x="90360" y="744480"/>
-            <a:ext cx="6612480" cy="3718440"/>
+            <a:ext cx="6612120" cy="3718080"/>
           </a:xfrm>
           <a:prstGeom prst="rect">
             <a:avLst/>
@@ -447,7 +447,7 @@
         <p:spPr>
           <a:xfrm>
             <a:off x="679680" y="4715280"/>
-            <a:ext cx="5433480" cy="4462200"/>
+            <a:ext cx="5433120" cy="4461840"/>
           </a:xfrm>
           <a:prstGeom prst="rect">
             <a:avLst/>
@@ -483,7 +483,7 @@
         <p:spPr>
           <a:xfrm>
             <a:off x="3850560" y="9428760"/>
-            <a:ext cx="2940840" cy="491760"/>
+            <a:ext cx="2940480" cy="491400"/>
           </a:xfrm>
           <a:prstGeom prst="rect">
             <a:avLst/>
@@ -509,7 +509,7 @@
                 <a:spcPct val="100000"/>
               </a:lnSpc>
             </a:pPr>
-            <a:fld id="{29C16091-83AF-4FCE-A65E-877699850779}" type="slidenum">
+            <a:fld id="{A725F712-A353-4FB3-B588-F781766F4DD3}" type="slidenum">
               <a:rPr b="0" lang="de-DE" sz="1300" spc="-1" strike="noStrike">
                 <a:solidFill>
                   <a:srgbClr val="000000"/>
@@ -9436,7 +9436,7 @@
         <p:spPr>
           <a:xfrm>
             <a:off x="11444760" y="0"/>
-            <a:ext cx="744480" cy="6853320"/>
+            <a:ext cx="744120" cy="6852960"/>
           </a:xfrm>
           <a:prstGeom prst="rect">
             <a:avLst/>
@@ -9461,11 +9461,17 @@
             <a:noAutofit/>
           </a:bodyPr>
           <a:p>
+            <a:pPr>
+              <a:lnSpc>
+                <a:spcPct val="100000"/>
+              </a:lnSpc>
+            </a:pPr>
             <a:endParaRPr b="0" lang="en-GB" sz="1800" spc="-1" strike="noStrike">
               <a:solidFill>
                 <a:srgbClr val="ffffff"/>
               </a:solidFill>
               <a:latin typeface="Arial"/>
+              <a:ea typeface="DejaVu Sans"/>
             </a:endParaRPr>
           </a:p>
         </p:txBody>
@@ -9479,7 +9485,7 @@
         <p:spPr>
           <a:xfrm>
             <a:off x="11438640" y="6453360"/>
-            <a:ext cx="761400" cy="400680"/>
+            <a:ext cx="761040" cy="400680"/>
           </a:xfrm>
           <a:prstGeom prst="rect">
             <a:avLst/>
@@ -9505,7 +9511,7 @@
                 <a:spcPct val="100000"/>
               </a:lnSpc>
             </a:pPr>
-            <a:fld id="{2729D629-189A-4AE5-9EAD-0A37F9EF52E7}" type="slidenum">
+            <a:fld id="{A8ED0302-A231-4A90-872F-263745A35ED3}" type="slidenum">
               <a:rPr b="0" lang="de-DE" sz="1800" spc="-1" strike="noStrike">
                 <a:solidFill>
                   <a:srgbClr val="808080"/>
@@ -9513,7 +9519,7 @@
                 <a:latin typeface="Arial Unicode MS"/>
                 <a:ea typeface="DejaVu Sans"/>
               </a:rPr>
-              <a:t>&lt;number&gt;</a:t>
+              <a:t>26</a:t>
             </a:fld>
             <a:endParaRPr b="0" lang="en-GB" sz="1800" spc="-1" strike="noStrike">
               <a:solidFill>
@@ -9533,7 +9539,7 @@
         <p:spPr>
           <a:xfrm>
             <a:off x="912240" y="1268280"/>
-            <a:ext cx="9211320" cy="364680"/>
+            <a:ext cx="9210960" cy="364320"/>
           </a:xfrm>
           <a:prstGeom prst="rect">
             <a:avLst/>
@@ -9554,11 +9560,17 @@
             <a:noAutofit/>
           </a:bodyPr>
           <a:p>
+            <a:pPr>
+              <a:lnSpc>
+                <a:spcPct val="100000"/>
+              </a:lnSpc>
+            </a:pPr>
             <a:endParaRPr b="0" lang="en-GB" sz="1800" spc="-1" strike="noStrike">
               <a:solidFill>
                 <a:srgbClr val="000000"/>
               </a:solidFill>
               <a:latin typeface="Arial"/>
+              <a:ea typeface="DejaVu Sans"/>
             </a:endParaRPr>
           </a:p>
         </p:txBody>
@@ -9576,7 +9588,7 @@
         <p:spPr>
           <a:xfrm>
             <a:off x="0" y="0"/>
-            <a:ext cx="3055320" cy="565200"/>
+            <a:ext cx="3054960" cy="564840"/>
           </a:xfrm>
           <a:prstGeom prst="rect">
             <a:avLst/>
@@ -9599,7 +9611,7 @@
         <p:spPr>
           <a:xfrm>
             <a:off x="7430400" y="134640"/>
-            <a:ext cx="3701160" cy="517320"/>
+            <a:ext cx="3700800" cy="516960"/>
           </a:xfrm>
           <a:prstGeom prst="rect">
             <a:avLst/>
@@ -9618,7 +9630,7 @@
         <p:spPr>
           <a:xfrm>
             <a:off x="912240" y="1268280"/>
-            <a:ext cx="9211320" cy="364680"/>
+            <a:ext cx="9210960" cy="364320"/>
           </a:xfrm>
           <a:prstGeom prst="rect">
             <a:avLst/>
@@ -9639,11 +9651,17 @@
             <a:noAutofit/>
           </a:bodyPr>
           <a:p>
+            <a:pPr>
+              <a:lnSpc>
+                <a:spcPct val="100000"/>
+              </a:lnSpc>
+            </a:pPr>
             <a:endParaRPr b="0" lang="en-GB" sz="1800" spc="-1" strike="noStrike">
               <a:solidFill>
                 <a:srgbClr val="000000"/>
               </a:solidFill>
               <a:latin typeface="Arial"/>
+              <a:ea typeface="DejaVu Sans"/>
             </a:endParaRPr>
           </a:p>
         </p:txBody>
@@ -9657,7 +9675,7 @@
         <p:spPr>
           <a:xfrm>
             <a:off x="11444760" y="0"/>
-            <a:ext cx="744480" cy="6853320"/>
+            <a:ext cx="744120" cy="6852960"/>
           </a:xfrm>
           <a:prstGeom prst="rect">
             <a:avLst/>
@@ -9682,11 +9700,17 @@
             <a:noAutofit/>
           </a:bodyPr>
           <a:p>
+            <a:pPr>
+              <a:lnSpc>
+                <a:spcPct val="100000"/>
+              </a:lnSpc>
+            </a:pPr>
             <a:endParaRPr b="0" lang="en-GB" sz="1800" spc="-1" strike="noStrike">
               <a:solidFill>
                 <a:srgbClr val="ffffff"/>
               </a:solidFill>
               <a:latin typeface="Arial"/>
+              <a:ea typeface="DejaVu Sans"/>
             </a:endParaRPr>
           </a:p>
         </p:txBody>
@@ -9700,7 +9724,7 @@
         <p:spPr>
           <a:xfrm>
             <a:off x="0" y="6642720"/>
-            <a:ext cx="12185640" cy="211320"/>
+            <a:ext cx="12185280" cy="211320"/>
           </a:xfrm>
           <a:prstGeom prst="rect">
             <a:avLst/>
@@ -10092,7 +10116,7 @@
         <p:spPr>
           <a:xfrm>
             <a:off x="11444760" y="0"/>
-            <a:ext cx="744480" cy="6853320"/>
+            <a:ext cx="744120" cy="6852960"/>
           </a:xfrm>
           <a:prstGeom prst="rect">
             <a:avLst/>
@@ -10117,11 +10141,17 @@
             <a:noAutofit/>
           </a:bodyPr>
           <a:p>
+            <a:pPr>
+              <a:lnSpc>
+                <a:spcPct val="100000"/>
+              </a:lnSpc>
+            </a:pPr>
             <a:endParaRPr b="0" lang="en-GB" sz="1800" spc="-1" strike="noStrike">
               <a:solidFill>
                 <a:srgbClr val="ffffff"/>
               </a:solidFill>
               <a:latin typeface="Arial"/>
+              <a:ea typeface="DejaVu Sans"/>
             </a:endParaRPr>
           </a:p>
         </p:txBody>
@@ -10135,7 +10165,7 @@
         <p:spPr>
           <a:xfrm>
             <a:off x="11438640" y="6453360"/>
-            <a:ext cx="761400" cy="400680"/>
+            <a:ext cx="761040" cy="400680"/>
           </a:xfrm>
           <a:prstGeom prst="rect">
             <a:avLst/>
@@ -10161,7 +10191,7 @@
                 <a:spcPct val="100000"/>
               </a:lnSpc>
             </a:pPr>
-            <a:fld id="{8EE1C91A-7FB1-4BDC-AE04-5C31A4BB314A}" type="slidenum">
+            <a:fld id="{8258EE05-5733-4BD9-87F8-0357446DE32E}" type="slidenum">
               <a:rPr b="0" lang="de-DE" sz="1800" spc="-1" strike="noStrike">
                 <a:solidFill>
                   <a:srgbClr val="808080"/>
@@ -10189,7 +10219,7 @@
         <p:spPr>
           <a:xfrm>
             <a:off x="912240" y="1268280"/>
-            <a:ext cx="9211320" cy="364680"/>
+            <a:ext cx="9210960" cy="364320"/>
           </a:xfrm>
           <a:prstGeom prst="rect">
             <a:avLst/>
@@ -10210,11 +10240,17 @@
             <a:noAutofit/>
           </a:bodyPr>
           <a:p>
+            <a:pPr>
+              <a:lnSpc>
+                <a:spcPct val="100000"/>
+              </a:lnSpc>
+            </a:pPr>
             <a:endParaRPr b="0" lang="en-GB" sz="1800" spc="-1" strike="noStrike">
               <a:solidFill>
                 <a:srgbClr val="000000"/>
               </a:solidFill>
               <a:latin typeface="Arial"/>
+              <a:ea typeface="DejaVu Sans"/>
             </a:endParaRPr>
           </a:p>
         </p:txBody>
@@ -10232,7 +10268,7 @@
         <p:spPr>
           <a:xfrm>
             <a:off x="0" y="0"/>
-            <a:ext cx="3055320" cy="565200"/>
+            <a:ext cx="3054960" cy="564840"/>
           </a:xfrm>
           <a:prstGeom prst="rect">
             <a:avLst/>
@@ -10255,7 +10291,7 @@
         <p:spPr>
           <a:xfrm>
             <a:off x="7430400" y="134640"/>
-            <a:ext cx="3701160" cy="517320"/>
+            <a:ext cx="3700800" cy="516960"/>
           </a:xfrm>
           <a:prstGeom prst="rect">
             <a:avLst/>
@@ -10274,7 +10310,7 @@
         <p:spPr>
           <a:xfrm>
             <a:off x="11444760" y="0"/>
-            <a:ext cx="744480" cy="6853320"/>
+            <a:ext cx="744120" cy="6852960"/>
           </a:xfrm>
           <a:prstGeom prst="rect">
             <a:avLst/>
@@ -10299,11 +10335,17 @@
             <a:noAutofit/>
           </a:bodyPr>
           <a:p>
+            <a:pPr>
+              <a:lnSpc>
+                <a:spcPct val="100000"/>
+              </a:lnSpc>
+            </a:pPr>
             <a:endParaRPr b="0" lang="en-GB" sz="1800" spc="-1" strike="noStrike">
               <a:solidFill>
                 <a:srgbClr val="ffffff"/>
               </a:solidFill>
               <a:latin typeface="Arial"/>
+              <a:ea typeface="DejaVu Sans"/>
             </a:endParaRPr>
           </a:p>
         </p:txBody>
@@ -10317,7 +10359,7 @@
         <p:spPr>
           <a:xfrm>
             <a:off x="11438640" y="6453360"/>
-            <a:ext cx="761400" cy="400680"/>
+            <a:ext cx="761040" cy="400680"/>
           </a:xfrm>
           <a:prstGeom prst="rect">
             <a:avLst/>
@@ -10343,7 +10385,7 @@
                 <a:spcPct val="100000"/>
               </a:lnSpc>
             </a:pPr>
-            <a:fld id="{D088086D-4682-4173-89F2-CEB02C4CF220}" type="slidenum">
+            <a:fld id="{1F7818BD-7B41-4B31-B686-09EF78EE6BAF}" type="slidenum">
               <a:rPr b="0" lang="de-DE" sz="1800" spc="-1" strike="noStrike">
                 <a:solidFill>
                   <a:srgbClr val="808080"/>
@@ -10371,7 +10413,7 @@
         <p:spPr>
           <a:xfrm>
             <a:off x="0" y="6642720"/>
-            <a:ext cx="12185640" cy="211320"/>
+            <a:ext cx="12185280" cy="211320"/>
           </a:xfrm>
           <a:prstGeom prst="rect">
             <a:avLst/>
@@ -10763,7 +10805,7 @@
         <p:spPr>
           <a:xfrm>
             <a:off x="11444760" y="0"/>
-            <a:ext cx="744480" cy="6853320"/>
+            <a:ext cx="744120" cy="6852960"/>
           </a:xfrm>
           <a:prstGeom prst="rect">
             <a:avLst/>
@@ -10788,11 +10830,17 @@
             <a:noAutofit/>
           </a:bodyPr>
           <a:p>
+            <a:pPr>
+              <a:lnSpc>
+                <a:spcPct val="100000"/>
+              </a:lnSpc>
+            </a:pPr>
             <a:endParaRPr b="0" lang="en-GB" sz="1800" spc="-1" strike="noStrike">
               <a:solidFill>
                 <a:srgbClr val="ffffff"/>
               </a:solidFill>
               <a:latin typeface="Arial"/>
+              <a:ea typeface="DejaVu Sans"/>
             </a:endParaRPr>
           </a:p>
         </p:txBody>
@@ -10806,7 +10854,7 @@
         <p:spPr>
           <a:xfrm>
             <a:off x="11438640" y="6453360"/>
-            <a:ext cx="761400" cy="400680"/>
+            <a:ext cx="761040" cy="400680"/>
           </a:xfrm>
           <a:prstGeom prst="rect">
             <a:avLst/>
@@ -10832,7 +10880,7 @@
                 <a:spcPct val="100000"/>
               </a:lnSpc>
             </a:pPr>
-            <a:fld id="{3A37E091-DE68-496B-A7C2-AE0FDB7874B4}" type="slidenum">
+            <a:fld id="{2EB61D19-9E4B-4DE9-B2F1-C7338FA2460B}" type="slidenum">
               <a:rPr b="0" lang="de-DE" sz="1800" spc="-1" strike="noStrike">
                 <a:solidFill>
                   <a:srgbClr val="808080"/>
@@ -10860,7 +10908,7 @@
         <p:spPr>
           <a:xfrm>
             <a:off x="912240" y="1268280"/>
-            <a:ext cx="9211320" cy="364680"/>
+            <a:ext cx="9210960" cy="364320"/>
           </a:xfrm>
           <a:prstGeom prst="rect">
             <a:avLst/>
@@ -10881,11 +10929,17 @@
             <a:noAutofit/>
           </a:bodyPr>
           <a:p>
+            <a:pPr>
+              <a:lnSpc>
+                <a:spcPct val="100000"/>
+              </a:lnSpc>
+            </a:pPr>
             <a:endParaRPr b="0" lang="en-GB" sz="1800" spc="-1" strike="noStrike">
               <a:solidFill>
                 <a:srgbClr val="000000"/>
               </a:solidFill>
               <a:latin typeface="Arial"/>
+              <a:ea typeface="DejaVu Sans"/>
             </a:endParaRPr>
           </a:p>
         </p:txBody>
@@ -10903,7 +10957,7 @@
         <p:spPr>
           <a:xfrm>
             <a:off x="0" y="0"/>
-            <a:ext cx="3055320" cy="565200"/>
+            <a:ext cx="3054960" cy="564840"/>
           </a:xfrm>
           <a:prstGeom prst="rect">
             <a:avLst/>
@@ -10926,7 +10980,7 @@
         <p:spPr>
           <a:xfrm>
             <a:off x="7430400" y="134640"/>
-            <a:ext cx="3701160" cy="517320"/>
+            <a:ext cx="3700800" cy="516960"/>
           </a:xfrm>
           <a:prstGeom prst="rect">
             <a:avLst/>
@@ -10945,7 +10999,7 @@
         <p:spPr>
           <a:xfrm>
             <a:off x="11444760" y="0"/>
-            <a:ext cx="744480" cy="6853320"/>
+            <a:ext cx="744120" cy="6852960"/>
           </a:xfrm>
           <a:prstGeom prst="rect">
             <a:avLst/>
@@ -10970,11 +11024,17 @@
             <a:noAutofit/>
           </a:bodyPr>
           <a:p>
+            <a:pPr>
+              <a:lnSpc>
+                <a:spcPct val="100000"/>
+              </a:lnSpc>
+            </a:pPr>
             <a:endParaRPr b="0" lang="en-GB" sz="1800" spc="-1" strike="noStrike">
               <a:solidFill>
                 <a:srgbClr val="ffffff"/>
               </a:solidFill>
               <a:latin typeface="Arial"/>
+              <a:ea typeface="DejaVu Sans"/>
             </a:endParaRPr>
           </a:p>
         </p:txBody>
@@ -10988,7 +11048,7 @@
         <p:spPr>
           <a:xfrm>
             <a:off x="11438640" y="6453360"/>
-            <a:ext cx="761400" cy="400680"/>
+            <a:ext cx="761040" cy="400680"/>
           </a:xfrm>
           <a:prstGeom prst="rect">
             <a:avLst/>
@@ -11014,7 +11074,7 @@
                 <a:spcPct val="100000"/>
               </a:lnSpc>
             </a:pPr>
-            <a:fld id="{EB57F8F1-02EC-4806-8808-04FA2A53B2F6}" type="slidenum">
+            <a:fld id="{623DE68E-1330-4D0B-A2A6-705BA7054DF0}" type="slidenum">
               <a:rPr b="0" lang="de-DE" sz="1800" spc="-1" strike="noStrike">
                 <a:solidFill>
                   <a:srgbClr val="808080"/>
@@ -11042,7 +11102,7 @@
         <p:spPr>
           <a:xfrm>
             <a:off x="0" y="6642720"/>
-            <a:ext cx="12185640" cy="211320"/>
+            <a:ext cx="12185280" cy="211320"/>
           </a:xfrm>
           <a:prstGeom prst="rect">
             <a:avLst/>
@@ -11434,7 +11494,7 @@
         <p:spPr>
           <a:xfrm>
             <a:off x="11444760" y="0"/>
-            <a:ext cx="741960" cy="6850800"/>
+            <a:ext cx="741600" cy="6850440"/>
           </a:xfrm>
           <a:prstGeom prst="rect">
             <a:avLst/>
@@ -11459,11 +11519,17 @@
             <a:noAutofit/>
           </a:bodyPr>
           <a:p>
+            <a:pPr>
+              <a:lnSpc>
+                <a:spcPct val="100000"/>
+              </a:lnSpc>
+            </a:pPr>
             <a:endParaRPr b="0" lang="en-GB" sz="1800" spc="-1" strike="noStrike">
               <a:solidFill>
                 <a:srgbClr val="ffffff"/>
               </a:solidFill>
               <a:latin typeface="Arial"/>
+              <a:ea typeface="DejaVu Sans"/>
             </a:endParaRPr>
           </a:p>
         </p:txBody>
@@ -11477,7 +11543,7 @@
         <p:spPr>
           <a:xfrm>
             <a:off x="11438640" y="6453360"/>
-            <a:ext cx="758880" cy="400680"/>
+            <a:ext cx="758520" cy="400680"/>
           </a:xfrm>
           <a:prstGeom prst="rect">
             <a:avLst/>
@@ -11503,7 +11569,7 @@
                 <a:spcPct val="100000"/>
               </a:lnSpc>
             </a:pPr>
-            <a:fld id="{01510B05-1A23-4180-922A-1A98FAF03DAE}" type="slidenum">
+            <a:fld id="{2AEECE89-5191-42FD-8854-44FEBD6A7000}" type="slidenum">
               <a:rPr b="0" lang="de-DE" sz="1800" spc="-1" strike="noStrike">
                 <a:solidFill>
                   <a:srgbClr val="808080"/>
@@ -11531,7 +11597,7 @@
         <p:spPr>
           <a:xfrm>
             <a:off x="912240" y="1268280"/>
-            <a:ext cx="9208800" cy="362160"/>
+            <a:ext cx="9208440" cy="361800"/>
           </a:xfrm>
           <a:prstGeom prst="rect">
             <a:avLst/>
@@ -11552,11 +11618,17 @@
             <a:noAutofit/>
           </a:bodyPr>
           <a:p>
+            <a:pPr>
+              <a:lnSpc>
+                <a:spcPct val="100000"/>
+              </a:lnSpc>
+            </a:pPr>
             <a:endParaRPr b="0" lang="en-GB" sz="1800" spc="-1" strike="noStrike">
               <a:solidFill>
                 <a:srgbClr val="000000"/>
               </a:solidFill>
               <a:latin typeface="Arial"/>
+              <a:ea typeface="DejaVu Sans"/>
             </a:endParaRPr>
           </a:p>
         </p:txBody>
@@ -11574,7 +11646,7 @@
         <p:spPr>
           <a:xfrm>
             <a:off x="0" y="0"/>
-            <a:ext cx="3052800" cy="562680"/>
+            <a:ext cx="3052440" cy="562320"/>
           </a:xfrm>
           <a:prstGeom prst="rect">
             <a:avLst/>
@@ -11597,7 +11669,7 @@
         <p:spPr>
           <a:xfrm>
             <a:off x="7430400" y="134640"/>
-            <a:ext cx="3698640" cy="514800"/>
+            <a:ext cx="3698280" cy="514440"/>
           </a:xfrm>
           <a:prstGeom prst="rect">
             <a:avLst/>
@@ -11616,7 +11688,7 @@
         <p:spPr>
           <a:xfrm>
             <a:off x="11444760" y="0"/>
-            <a:ext cx="741960" cy="6850800"/>
+            <a:ext cx="741600" cy="6850440"/>
           </a:xfrm>
           <a:prstGeom prst="rect">
             <a:avLst/>
@@ -11641,11 +11713,17 @@
             <a:noAutofit/>
           </a:bodyPr>
           <a:p>
+            <a:pPr>
+              <a:lnSpc>
+                <a:spcPct val="100000"/>
+              </a:lnSpc>
+            </a:pPr>
             <a:endParaRPr b="0" lang="en-GB" sz="1800" spc="-1" strike="noStrike">
               <a:solidFill>
                 <a:srgbClr val="ffffff"/>
               </a:solidFill>
               <a:latin typeface="Arial"/>
+              <a:ea typeface="DejaVu Sans"/>
             </a:endParaRPr>
           </a:p>
         </p:txBody>
@@ -11659,7 +11737,7 @@
         <p:spPr>
           <a:xfrm>
             <a:off x="11438640" y="6453360"/>
-            <a:ext cx="758880" cy="400680"/>
+            <a:ext cx="758520" cy="400680"/>
           </a:xfrm>
           <a:prstGeom prst="rect">
             <a:avLst/>
@@ -11685,7 +11763,7 @@
                 <a:spcPct val="100000"/>
               </a:lnSpc>
             </a:pPr>
-            <a:fld id="{D7FF2A47-AC1D-490F-9A78-595C42ABEC0F}" type="slidenum">
+            <a:fld id="{2697D6C5-1194-4C4E-9796-71427F98F597}" type="slidenum">
               <a:rPr b="0" lang="de-DE" sz="1800" spc="-1" strike="noStrike">
                 <a:solidFill>
                   <a:srgbClr val="808080"/>
@@ -11713,7 +11791,7 @@
         <p:spPr>
           <a:xfrm>
             <a:off x="0" y="6642720"/>
-            <a:ext cx="12182760" cy="211320"/>
+            <a:ext cx="12182400" cy="211320"/>
           </a:xfrm>
           <a:prstGeom prst="rect">
             <a:avLst/>
@@ -12105,7 +12183,7 @@
         <p:spPr>
           <a:xfrm>
             <a:off x="11444760" y="0"/>
-            <a:ext cx="741960" cy="6850800"/>
+            <a:ext cx="741600" cy="6850440"/>
           </a:xfrm>
           <a:prstGeom prst="rect">
             <a:avLst/>
@@ -12130,11 +12208,17 @@
             <a:noAutofit/>
           </a:bodyPr>
           <a:p>
+            <a:pPr>
+              <a:lnSpc>
+                <a:spcPct val="100000"/>
+              </a:lnSpc>
+            </a:pPr>
             <a:endParaRPr b="0" lang="en-GB" sz="1800" spc="-1" strike="noStrike">
               <a:solidFill>
                 <a:srgbClr val="ffffff"/>
               </a:solidFill>
               <a:latin typeface="Arial"/>
+              <a:ea typeface="DejaVu Sans"/>
             </a:endParaRPr>
           </a:p>
         </p:txBody>
@@ -12148,7 +12232,7 @@
         <p:spPr>
           <a:xfrm>
             <a:off x="11438640" y="6453360"/>
-            <a:ext cx="758880" cy="400680"/>
+            <a:ext cx="758520" cy="400680"/>
           </a:xfrm>
           <a:prstGeom prst="rect">
             <a:avLst/>
@@ -12174,7 +12258,7 @@
                 <a:spcPct val="100000"/>
               </a:lnSpc>
             </a:pPr>
-            <a:fld id="{72026F39-1E26-4873-9B1E-F98F0BE8EE88}" type="slidenum">
+            <a:fld id="{4164904E-43E0-41CD-A79C-3785309D3FCB}" type="slidenum">
               <a:rPr b="0" lang="de-DE" sz="1800" spc="-1" strike="noStrike">
                 <a:solidFill>
                   <a:srgbClr val="808080"/>
@@ -12202,7 +12286,7 @@
         <p:spPr>
           <a:xfrm>
             <a:off x="912240" y="1268280"/>
-            <a:ext cx="9208800" cy="362160"/>
+            <a:ext cx="9208440" cy="361800"/>
           </a:xfrm>
           <a:prstGeom prst="rect">
             <a:avLst/>
@@ -12223,11 +12307,17 @@
             <a:noAutofit/>
           </a:bodyPr>
           <a:p>
+            <a:pPr>
+              <a:lnSpc>
+                <a:spcPct val="100000"/>
+              </a:lnSpc>
+            </a:pPr>
             <a:endParaRPr b="0" lang="en-GB" sz="1800" spc="-1" strike="noStrike">
               <a:solidFill>
                 <a:srgbClr val="000000"/>
               </a:solidFill>
               <a:latin typeface="Arial"/>
+              <a:ea typeface="DejaVu Sans"/>
             </a:endParaRPr>
           </a:p>
         </p:txBody>
@@ -12245,7 +12335,7 @@
         <p:spPr>
           <a:xfrm>
             <a:off x="0" y="0"/>
-            <a:ext cx="3052800" cy="562680"/>
+            <a:ext cx="3052440" cy="562320"/>
           </a:xfrm>
           <a:prstGeom prst="rect">
             <a:avLst/>
@@ -12268,7 +12358,7 @@
         <p:spPr>
           <a:xfrm>
             <a:off x="7430400" y="134640"/>
-            <a:ext cx="3698640" cy="514800"/>
+            <a:ext cx="3698280" cy="514440"/>
           </a:xfrm>
           <a:prstGeom prst="rect">
             <a:avLst/>
@@ -12287,7 +12377,7 @@
         <p:spPr>
           <a:xfrm>
             <a:off x="11444760" y="0"/>
-            <a:ext cx="741960" cy="6850800"/>
+            <a:ext cx="741600" cy="6850440"/>
           </a:xfrm>
           <a:prstGeom prst="rect">
             <a:avLst/>
@@ -12312,11 +12402,17 @@
             <a:noAutofit/>
           </a:bodyPr>
           <a:p>
+            <a:pPr>
+              <a:lnSpc>
+                <a:spcPct val="100000"/>
+              </a:lnSpc>
+            </a:pPr>
             <a:endParaRPr b="0" lang="en-GB" sz="1800" spc="-1" strike="noStrike">
               <a:solidFill>
                 <a:srgbClr val="ffffff"/>
               </a:solidFill>
               <a:latin typeface="Arial"/>
+              <a:ea typeface="DejaVu Sans"/>
             </a:endParaRPr>
           </a:p>
         </p:txBody>
@@ -12330,7 +12426,7 @@
         <p:spPr>
           <a:xfrm>
             <a:off x="11438640" y="6453360"/>
-            <a:ext cx="758880" cy="400680"/>
+            <a:ext cx="758520" cy="400680"/>
           </a:xfrm>
           <a:prstGeom prst="rect">
             <a:avLst/>
@@ -12356,7 +12452,7 @@
                 <a:spcPct val="100000"/>
               </a:lnSpc>
             </a:pPr>
-            <a:fld id="{1C9C524F-CF56-4569-8330-6201EB1892CA}" type="slidenum">
+            <a:fld id="{E3FC9C42-23F6-4C72-AC17-005E92C7B179}" type="slidenum">
               <a:rPr b="0" lang="de-DE" sz="1800" spc="-1" strike="noStrike">
                 <a:solidFill>
                   <a:srgbClr val="808080"/>
@@ -12384,7 +12480,7 @@
         <p:spPr>
           <a:xfrm>
             <a:off x="0" y="6642720"/>
-            <a:ext cx="12182760" cy="211320"/>
+            <a:ext cx="12182400" cy="211320"/>
           </a:xfrm>
           <a:prstGeom prst="rect">
             <a:avLst/>
@@ -12769,7 +12865,7 @@
         <p:spPr>
           <a:xfrm>
             <a:off x="527400" y="1412640"/>
-            <a:ext cx="10364400" cy="1150920"/>
+            <a:ext cx="10364040" cy="1150560"/>
           </a:xfrm>
           <a:prstGeom prst="rect">
             <a:avLst/>
@@ -12823,7 +12919,7 @@
         <p:spPr>
           <a:xfrm>
             <a:off x="527400" y="2852640"/>
-            <a:ext cx="10364400" cy="2371680"/>
+            <a:ext cx="10364040" cy="2371320"/>
           </a:xfrm>
           <a:prstGeom prst="rect">
             <a:avLst/>
@@ -13125,7 +13221,7 @@
         <p:spPr>
           <a:xfrm>
             <a:off x="335520" y="764640"/>
-            <a:ext cx="10748520" cy="499320"/>
+            <a:ext cx="10748160" cy="498960"/>
           </a:xfrm>
           <a:prstGeom prst="rect">
             <a:avLst/>
@@ -13179,7 +13275,7 @@
         <p:spPr>
           <a:xfrm>
             <a:off x="263520" y="6411600"/>
-            <a:ext cx="7252200" cy="226800"/>
+            <a:ext cx="7251840" cy="226800"/>
           </a:xfrm>
           <a:prstGeom prst="rect">
             <a:avLst/>
@@ -13233,7 +13329,7 @@
         <p:spPr>
           <a:xfrm>
             <a:off x="335520" y="1268640"/>
-            <a:ext cx="10749240" cy="5036760"/>
+            <a:ext cx="10748880" cy="5036400"/>
           </a:xfrm>
           <a:prstGeom prst="rect">
             <a:avLst/>
@@ -13430,7 +13526,7 @@
         <p:spPr>
           <a:xfrm>
             <a:off x="335520" y="764640"/>
-            <a:ext cx="10748520" cy="499320"/>
+            <a:ext cx="10748160" cy="498960"/>
           </a:xfrm>
           <a:prstGeom prst="rect">
             <a:avLst/>
@@ -13484,7 +13580,7 @@
         <p:spPr>
           <a:xfrm>
             <a:off x="263520" y="6411600"/>
-            <a:ext cx="7252200" cy="226800"/>
+            <a:ext cx="7251840" cy="226800"/>
           </a:xfrm>
           <a:prstGeom prst="rect">
             <a:avLst/>
@@ -13538,7 +13634,7 @@
         <p:spPr>
           <a:xfrm>
             <a:off x="335520" y="1268640"/>
-            <a:ext cx="10749240" cy="5036760"/>
+            <a:ext cx="10748880" cy="5036400"/>
           </a:xfrm>
           <a:prstGeom prst="rect">
             <a:avLst/>
@@ -13741,7 +13837,7 @@
         <p:spPr>
           <a:xfrm>
             <a:off x="335520" y="764640"/>
-            <a:ext cx="10748520" cy="499320"/>
+            <a:ext cx="10748160" cy="498960"/>
           </a:xfrm>
           <a:prstGeom prst="rect">
             <a:avLst/>
@@ -13795,7 +13891,7 @@
         <p:spPr>
           <a:xfrm>
             <a:off x="263520" y="6411600"/>
-            <a:ext cx="7252200" cy="226800"/>
+            <a:ext cx="7251840" cy="226800"/>
           </a:xfrm>
           <a:prstGeom prst="rect">
             <a:avLst/>
@@ -13849,7 +13945,7 @@
         <p:spPr>
           <a:xfrm>
             <a:off x="335520" y="1268640"/>
-            <a:ext cx="10749240" cy="5036760"/>
+            <a:ext cx="10748880" cy="5036400"/>
           </a:xfrm>
           <a:prstGeom prst="rect">
             <a:avLst/>
@@ -14058,7 +14154,7 @@
         <p:spPr>
           <a:xfrm>
             <a:off x="335520" y="764640"/>
-            <a:ext cx="10748520" cy="499320"/>
+            <a:ext cx="10748160" cy="498960"/>
           </a:xfrm>
           <a:prstGeom prst="rect">
             <a:avLst/>
@@ -14112,7 +14208,7 @@
         <p:spPr>
           <a:xfrm>
             <a:off x="263520" y="6411600"/>
-            <a:ext cx="7252200" cy="226800"/>
+            <a:ext cx="7251840" cy="226800"/>
           </a:xfrm>
           <a:prstGeom prst="rect">
             <a:avLst/>
@@ -14166,7 +14262,7 @@
         <p:spPr>
           <a:xfrm>
             <a:off x="335520" y="1268640"/>
-            <a:ext cx="10749240" cy="5036760"/>
+            <a:ext cx="10748880" cy="5036400"/>
           </a:xfrm>
           <a:prstGeom prst="rect">
             <a:avLst/>
@@ -14387,7 +14483,7 @@
         <p:spPr>
           <a:xfrm>
             <a:off x="335520" y="764640"/>
-            <a:ext cx="10749240" cy="500040"/>
+            <a:ext cx="10748880" cy="499680"/>
           </a:xfrm>
           <a:prstGeom prst="rect">
             <a:avLst/>
@@ -14441,7 +14537,7 @@
         <p:spPr>
           <a:xfrm>
             <a:off x="335520" y="1268640"/>
-            <a:ext cx="10749240" cy="5036760"/>
+            <a:ext cx="10748880" cy="5036400"/>
           </a:xfrm>
           <a:prstGeom prst="rect">
             <a:avLst/>
@@ -14570,7 +14666,7 @@
         <p:spPr>
           <a:xfrm>
             <a:off x="335520" y="4406760"/>
-            <a:ext cx="10748520" cy="1357560"/>
+            <a:ext cx="10748160" cy="1357200"/>
           </a:xfrm>
           <a:prstGeom prst="rect">
             <a:avLst/>
@@ -14624,7 +14720,7 @@
         <p:spPr>
           <a:xfrm>
             <a:off x="335520" y="2906640"/>
-            <a:ext cx="10748520" cy="1495440"/>
+            <a:ext cx="10748160" cy="1495080"/>
           </a:xfrm>
           <a:prstGeom prst="rect">
             <a:avLst/>
@@ -14645,11 +14741,17 @@
             <a:noAutofit/>
           </a:bodyPr>
           <a:p>
+            <a:pPr>
+              <a:lnSpc>
+                <a:spcPct val="100000"/>
+              </a:lnSpc>
+            </a:pPr>
             <a:endParaRPr b="0" lang="en-GB" sz="1800" spc="-1" strike="noStrike">
               <a:solidFill>
                 <a:srgbClr val="000000"/>
               </a:solidFill>
               <a:latin typeface="Arial"/>
+              <a:ea typeface="DejaVu Sans"/>
             </a:endParaRPr>
           </a:p>
         </p:txBody>
@@ -14693,7 +14795,7 @@
         <p:spPr>
           <a:xfrm>
             <a:off x="335520" y="764640"/>
-            <a:ext cx="10749240" cy="500040"/>
+            <a:ext cx="10748880" cy="499680"/>
           </a:xfrm>
           <a:prstGeom prst="rect">
             <a:avLst/>
@@ -14747,7 +14849,7 @@
         <p:spPr>
           <a:xfrm>
             <a:off x="335520" y="1268640"/>
-            <a:ext cx="10749240" cy="5036760"/>
+            <a:ext cx="10748880" cy="5036400"/>
           </a:xfrm>
           <a:prstGeom prst="rect">
             <a:avLst/>
@@ -14938,7 +15040,7 @@
         <p:spPr>
           <a:xfrm>
             <a:off x="263520" y="6411600"/>
-            <a:ext cx="8971200" cy="226800"/>
+            <a:ext cx="8970840" cy="226800"/>
           </a:xfrm>
           <a:prstGeom prst="rect">
             <a:avLst/>
@@ -15022,7 +15124,7 @@
         <p:spPr>
           <a:xfrm>
             <a:off x="335520" y="764640"/>
-            <a:ext cx="10749240" cy="500040"/>
+            <a:ext cx="10748880" cy="499680"/>
           </a:xfrm>
           <a:prstGeom prst="rect">
             <a:avLst/>
@@ -15076,7 +15178,7 @@
         <p:spPr>
           <a:xfrm>
             <a:off x="335520" y="1268640"/>
-            <a:ext cx="10749240" cy="5036760"/>
+            <a:ext cx="10748880" cy="5036400"/>
           </a:xfrm>
           <a:prstGeom prst="rect">
             <a:avLst/>
@@ -15213,7 +15315,7 @@
         <p:spPr>
           <a:xfrm>
             <a:off x="263520" y="6411600"/>
-            <a:ext cx="8971200" cy="226800"/>
+            <a:ext cx="8970840" cy="226800"/>
           </a:xfrm>
           <a:prstGeom prst="rect">
             <a:avLst/>
@@ -15297,7 +15399,7 @@
         <p:spPr>
           <a:xfrm>
             <a:off x="335520" y="764640"/>
-            <a:ext cx="10749240" cy="500040"/>
+            <a:ext cx="10748880" cy="499680"/>
           </a:xfrm>
           <a:prstGeom prst="rect">
             <a:avLst/>
@@ -15351,7 +15453,7 @@
         <p:spPr>
           <a:xfrm>
             <a:off x="335520" y="1268640"/>
-            <a:ext cx="10749240" cy="5036760"/>
+            <a:ext cx="10748880" cy="5036400"/>
           </a:xfrm>
           <a:prstGeom prst="rect">
             <a:avLst/>
@@ -15654,7 +15756,7 @@
         <p:spPr>
           <a:xfrm>
             <a:off x="263520" y="6411600"/>
-            <a:ext cx="8971200" cy="226800"/>
+            <a:ext cx="8970840" cy="226800"/>
           </a:xfrm>
           <a:prstGeom prst="rect">
             <a:avLst/>
@@ -15738,7 +15840,7 @@
         <p:spPr>
           <a:xfrm>
             <a:off x="335520" y="764640"/>
-            <a:ext cx="10749240" cy="500040"/>
+            <a:ext cx="10748880" cy="499680"/>
           </a:xfrm>
           <a:prstGeom prst="rect">
             <a:avLst/>
@@ -15792,7 +15894,7 @@
         <p:spPr>
           <a:xfrm>
             <a:off x="335520" y="1268640"/>
-            <a:ext cx="10749240" cy="5036760"/>
+            <a:ext cx="10748880" cy="5036400"/>
           </a:xfrm>
           <a:prstGeom prst="rect">
             <a:avLst/>
@@ -15961,7 +16063,7 @@
         <p:spPr>
           <a:xfrm>
             <a:off x="263520" y="6411600"/>
-            <a:ext cx="8971200" cy="226800"/>
+            <a:ext cx="8970840" cy="226800"/>
           </a:xfrm>
           <a:prstGeom prst="rect">
             <a:avLst/>
@@ -16045,7 +16147,7 @@
         <p:spPr>
           <a:xfrm>
             <a:off x="335520" y="764640"/>
-            <a:ext cx="10738800" cy="489600"/>
+            <a:ext cx="10738440" cy="489240"/>
           </a:xfrm>
           <a:prstGeom prst="rect">
             <a:avLst/>
@@ -16099,7 +16201,7 @@
         <p:spPr>
           <a:xfrm>
             <a:off x="335520" y="1268280"/>
-            <a:ext cx="10738800" cy="5026320"/>
+            <a:ext cx="10738440" cy="5025960"/>
           </a:xfrm>
           <a:prstGeom prst="rect">
             <a:avLst/>
@@ -16333,7 +16435,7 @@
         <p:spPr>
           <a:xfrm>
             <a:off x="335520" y="764640"/>
-            <a:ext cx="10749240" cy="500040"/>
+            <a:ext cx="10748880" cy="499680"/>
           </a:xfrm>
           <a:prstGeom prst="rect">
             <a:avLst/>
@@ -16387,7 +16489,7 @@
         <p:spPr>
           <a:xfrm>
             <a:off x="335520" y="1268640"/>
-            <a:ext cx="10749240" cy="5036760"/>
+            <a:ext cx="10748880" cy="5036400"/>
           </a:xfrm>
           <a:prstGeom prst="rect">
             <a:avLst/>
@@ -16522,7 +16624,7 @@
         <p:spPr>
           <a:xfrm>
             <a:off x="335520" y="4406760"/>
-            <a:ext cx="10748520" cy="1357560"/>
+            <a:ext cx="10748160" cy="1357200"/>
           </a:xfrm>
           <a:prstGeom prst="rect">
             <a:avLst/>
@@ -16576,7 +16678,7 @@
         <p:spPr>
           <a:xfrm>
             <a:off x="335520" y="2906640"/>
-            <a:ext cx="10748520" cy="1495440"/>
+            <a:ext cx="10748160" cy="1495080"/>
           </a:xfrm>
           <a:prstGeom prst="rect">
             <a:avLst/>
@@ -16597,11 +16699,17 @@
             <a:noAutofit/>
           </a:bodyPr>
           <a:p>
+            <a:pPr>
+              <a:lnSpc>
+                <a:spcPct val="100000"/>
+              </a:lnSpc>
+            </a:pPr>
             <a:endParaRPr b="0" lang="en-GB" sz="1800" spc="-1" strike="noStrike">
               <a:solidFill>
                 <a:srgbClr val="000000"/>
               </a:solidFill>
               <a:latin typeface="Arial"/>
+              <a:ea typeface="DejaVu Sans"/>
             </a:endParaRPr>
           </a:p>
         </p:txBody>
@@ -16645,7 +16753,7 @@
         <p:spPr>
           <a:xfrm>
             <a:off x="335520" y="764640"/>
-            <a:ext cx="10749240" cy="500040"/>
+            <a:ext cx="10748880" cy="499680"/>
           </a:xfrm>
           <a:prstGeom prst="rect">
             <a:avLst/>
@@ -16699,7 +16807,7 @@
         <p:spPr>
           <a:xfrm>
             <a:off x="335520" y="1268640"/>
-            <a:ext cx="10749240" cy="5036760"/>
+            <a:ext cx="10748880" cy="5036400"/>
           </a:xfrm>
           <a:prstGeom prst="rect">
             <a:avLst/>
@@ -17112,7 +17220,7 @@
         <p:spPr>
           <a:xfrm>
             <a:off x="335520" y="764640"/>
-            <a:ext cx="10749240" cy="500040"/>
+            <a:ext cx="10748880" cy="499680"/>
           </a:xfrm>
           <a:prstGeom prst="rect">
             <a:avLst/>
@@ -17166,7 +17274,7 @@
         <p:spPr>
           <a:xfrm>
             <a:off x="335520" y="1268640"/>
-            <a:ext cx="10749240" cy="5036760"/>
+            <a:ext cx="10748880" cy="5036400"/>
           </a:xfrm>
           <a:prstGeom prst="rect">
             <a:avLst/>
@@ -17451,7 +17559,7 @@
         <p:spPr>
           <a:xfrm>
             <a:off x="335520" y="764640"/>
-            <a:ext cx="10749240" cy="500040"/>
+            <a:ext cx="10748880" cy="499680"/>
           </a:xfrm>
           <a:prstGeom prst="rect">
             <a:avLst/>
@@ -17505,7 +17613,7 @@
         <p:spPr>
           <a:xfrm>
             <a:off x="335520" y="1268640"/>
-            <a:ext cx="10749240" cy="5036760"/>
+            <a:ext cx="10748880" cy="5036400"/>
           </a:xfrm>
           <a:prstGeom prst="rect">
             <a:avLst/>
@@ -17828,7 +17936,7 @@
         <p:spPr>
           <a:xfrm>
             <a:off x="7289640" y="840960"/>
-            <a:ext cx="3771360" cy="2264760"/>
+            <a:ext cx="3771000" cy="2264400"/>
           </a:xfrm>
           <a:prstGeom prst="rect">
             <a:avLst/>
@@ -17851,7 +17959,7 @@
         <p:spPr>
           <a:xfrm>
             <a:off x="7315200" y="3291840"/>
-            <a:ext cx="3800520" cy="2306880"/>
+            <a:ext cx="3800160" cy="2306520"/>
           </a:xfrm>
           <a:prstGeom prst="rect">
             <a:avLst/>
@@ -17870,7 +17978,7 @@
         <p:spPr>
           <a:xfrm>
             <a:off x="7772400" y="5669280"/>
-            <a:ext cx="3207960" cy="226800"/>
+            <a:ext cx="3207600" cy="226800"/>
           </a:xfrm>
           <a:prstGeom prst="rect">
             <a:avLst/>
@@ -17924,7 +18032,7 @@
         <p:spPr>
           <a:xfrm>
             <a:off x="263520" y="6411600"/>
-            <a:ext cx="10890360" cy="382320"/>
+            <a:ext cx="10890000" cy="382320"/>
           </a:xfrm>
           <a:prstGeom prst="rect">
             <a:avLst/>
@@ -18020,7 +18128,7 @@
         <p:spPr>
           <a:xfrm>
             <a:off x="335520" y="764640"/>
-            <a:ext cx="10749240" cy="500040"/>
+            <a:ext cx="10748880" cy="499680"/>
           </a:xfrm>
           <a:prstGeom prst="rect">
             <a:avLst/>
@@ -18074,7 +18182,7 @@
         <p:spPr>
           <a:xfrm>
             <a:off x="335520" y="1268640"/>
-            <a:ext cx="10749240" cy="5036760"/>
+            <a:ext cx="10748880" cy="5036400"/>
           </a:xfrm>
           <a:prstGeom prst="rect">
             <a:avLst/>
@@ -18391,7 +18499,7 @@
         <p:spPr>
           <a:xfrm>
             <a:off x="335520" y="4406760"/>
-            <a:ext cx="10746000" cy="1355040"/>
+            <a:ext cx="10745640" cy="1354680"/>
           </a:xfrm>
           <a:prstGeom prst="rect">
             <a:avLst/>
@@ -18425,7 +18533,7 @@
                 <a:latin typeface="DejaVu Sans"/>
                 <a:ea typeface="DejaVu Sans"/>
               </a:rPr>
-              <a:t>Exercise E04</a:t>
+              <a:t>Exercise E05</a:t>
             </a:r>
             <a:endParaRPr b="0" lang="en-GB" sz="3000" spc="-1" strike="noStrike">
               <a:solidFill>
@@ -18445,7 +18553,7 @@
         <p:spPr>
           <a:xfrm>
             <a:off x="335520" y="2906640"/>
-            <a:ext cx="10746000" cy="1492920"/>
+            <a:ext cx="10745640" cy="1492560"/>
           </a:xfrm>
           <a:prstGeom prst="rect">
             <a:avLst/>
@@ -18466,11 +18574,17 @@
             <a:noAutofit/>
           </a:bodyPr>
           <a:p>
+            <a:pPr>
+              <a:lnSpc>
+                <a:spcPct val="100000"/>
+              </a:lnSpc>
+            </a:pPr>
             <a:endParaRPr b="0" lang="en-GB" sz="1800" spc="-1" strike="noStrike">
               <a:solidFill>
                 <a:srgbClr val="000000"/>
               </a:solidFill>
               <a:latin typeface="Arial"/>
+              <a:ea typeface="DejaVu Sans"/>
             </a:endParaRPr>
           </a:p>
         </p:txBody>
@@ -18514,7 +18628,7 @@
         <p:spPr>
           <a:xfrm>
             <a:off x="335520" y="764640"/>
-            <a:ext cx="10746000" cy="496800"/>
+            <a:ext cx="10745640" cy="496440"/>
           </a:xfrm>
           <a:prstGeom prst="rect">
             <a:avLst/>
@@ -18548,7 +18662,7 @@
                 <a:latin typeface="DejaVu Sans"/>
                 <a:ea typeface="DejaVu Sans"/>
               </a:rPr>
-              <a:t>E04 – IoT Processing</a:t>
+              <a:t>E05 – IoT Processing</a:t>
             </a:r>
             <a:endParaRPr b="0" lang="en-GB" sz="2400" spc="-1" strike="noStrike">
               <a:solidFill>
@@ -18581,7 +18695,7 @@
         <p:spPr>
           <a:xfrm>
             <a:off x="335520" y="1268640"/>
-            <a:ext cx="10746000" cy="5033520"/>
+            <a:ext cx="10745640" cy="5033160"/>
           </a:xfrm>
           <a:prstGeom prst="rect">
             <a:avLst/>
@@ -18626,7 +18740,7 @@
                 <a:latin typeface="DejaVu Sans"/>
                 <a:ea typeface="DejaVu Sans"/>
               </a:rPr>
-              <a:t>In E03, you gathered weather data from different sources (sensors) and aggregated</a:t>
+              <a:t>In E04, you gathered weather data from different sources (sensors) and aggregated</a:t>
             </a:r>
             <a:endParaRPr b="0" lang="en-GB" sz="1800" spc="-1" strike="noStrike">
               <a:solidFill>
@@ -18836,7 +18950,7 @@
         <p:spPr>
           <a:xfrm>
             <a:off x="335520" y="1268640"/>
-            <a:ext cx="10748520" cy="5036040"/>
+            <a:ext cx="10748160" cy="5035680"/>
           </a:xfrm>
           <a:prstGeom prst="rect">
             <a:avLst/>
@@ -18896,7 +19010,7 @@
         <p:spPr>
           <a:xfrm>
             <a:off x="335520" y="764640"/>
-            <a:ext cx="10748520" cy="499320"/>
+            <a:ext cx="10748160" cy="498960"/>
           </a:xfrm>
           <a:prstGeom prst="rect">
             <a:avLst/>
@@ -18917,11 +19031,17 @@
             <a:noAutofit/>
           </a:bodyPr>
           <a:p>
+            <a:pPr>
+              <a:lnSpc>
+                <a:spcPct val="100000"/>
+              </a:lnSpc>
+            </a:pPr>
             <a:endParaRPr b="0" lang="en-GB" sz="1800" spc="-1" strike="noStrike">
               <a:solidFill>
                 <a:srgbClr val="000000"/>
               </a:solidFill>
               <a:latin typeface="Arial"/>
+              <a:ea typeface="DejaVu Sans"/>
             </a:endParaRPr>
           </a:p>
         </p:txBody>
@@ -18965,7 +19085,7 @@
         <p:spPr>
           <a:xfrm>
             <a:off x="335520" y="4406760"/>
-            <a:ext cx="10748520" cy="1357560"/>
+            <a:ext cx="10748160" cy="1357200"/>
           </a:xfrm>
           <a:prstGeom prst="rect">
             <a:avLst/>
@@ -19019,7 +19139,7 @@
         <p:spPr>
           <a:xfrm>
             <a:off x="335520" y="2906640"/>
-            <a:ext cx="10748520" cy="1495440"/>
+            <a:ext cx="10748160" cy="1495080"/>
           </a:xfrm>
           <a:prstGeom prst="rect">
             <a:avLst/>
@@ -19040,11 +19160,17 @@
             <a:noAutofit/>
           </a:bodyPr>
           <a:p>
+            <a:pPr>
+              <a:lnSpc>
+                <a:spcPct val="100000"/>
+              </a:lnSpc>
+            </a:pPr>
             <a:endParaRPr b="0" lang="en-GB" sz="1800" spc="-1" strike="noStrike">
               <a:solidFill>
                 <a:srgbClr val="000000"/>
               </a:solidFill>
               <a:latin typeface="Arial"/>
+              <a:ea typeface="DejaVu Sans"/>
             </a:endParaRPr>
           </a:p>
         </p:txBody>
@@ -19088,7 +19214,7 @@
         <p:spPr>
           <a:xfrm>
             <a:off x="335520" y="764640"/>
-            <a:ext cx="10748520" cy="499320"/>
+            <a:ext cx="10748160" cy="498960"/>
           </a:xfrm>
           <a:prstGeom prst="rect">
             <a:avLst/>
@@ -19146,7 +19272,7 @@
         <p:spPr>
           <a:xfrm>
             <a:off x="727560" y="2110320"/>
-            <a:ext cx="9964440" cy="3686040"/>
+            <a:ext cx="9964080" cy="3685680"/>
           </a:xfrm>
           <a:prstGeom prst="rect">
             <a:avLst/>
@@ -19195,7 +19321,7 @@
         <p:spPr>
           <a:xfrm>
             <a:off x="335520" y="764640"/>
-            <a:ext cx="10748520" cy="499320"/>
+            <a:ext cx="10748160" cy="498960"/>
           </a:xfrm>
           <a:prstGeom prst="rect">
             <a:avLst/>
@@ -19253,7 +19379,7 @@
         <p:spPr>
           <a:xfrm>
             <a:off x="1097280" y="1265760"/>
-            <a:ext cx="9050760" cy="5099040"/>
+            <a:ext cx="9050400" cy="5098680"/>
           </a:xfrm>
           <a:prstGeom prst="rect">
             <a:avLst/>
@@ -19272,7 +19398,7 @@
         <p:spPr>
           <a:xfrm>
             <a:off x="263520" y="6411600"/>
-            <a:ext cx="9975960" cy="245160"/>
+            <a:ext cx="9975600" cy="245160"/>
           </a:xfrm>
           <a:prstGeom prst="rect">
             <a:avLst/>
@@ -19368,7 +19494,7 @@
         <p:spPr>
           <a:xfrm>
             <a:off x="335520" y="764640"/>
-            <a:ext cx="10748520" cy="499320"/>
+            <a:ext cx="10748160" cy="498960"/>
           </a:xfrm>
           <a:prstGeom prst="rect">
             <a:avLst/>
@@ -19426,7 +19552,7 @@
         <p:spPr>
           <a:xfrm>
             <a:off x="745560" y="1884600"/>
-            <a:ext cx="10056960" cy="4201920"/>
+            <a:ext cx="10056600" cy="4201560"/>
           </a:xfrm>
           <a:prstGeom prst="rect">
             <a:avLst/>
@@ -19475,7 +19601,7 @@
         <p:spPr>
           <a:xfrm>
             <a:off x="335520" y="764640"/>
-            <a:ext cx="10749240" cy="500040"/>
+            <a:ext cx="10748880" cy="499680"/>
           </a:xfrm>
           <a:prstGeom prst="rect">
             <a:avLst/>
@@ -19529,7 +19655,7 @@
         <p:spPr>
           <a:xfrm>
             <a:off x="335520" y="1268640"/>
-            <a:ext cx="10749240" cy="5036760"/>
+            <a:ext cx="10748880" cy="5036400"/>
           </a:xfrm>
           <a:prstGeom prst="rect">
             <a:avLst/>
@@ -19776,7 +19902,7 @@
         <p:spPr>
           <a:xfrm>
             <a:off x="335520" y="764640"/>
-            <a:ext cx="10748520" cy="499320"/>
+            <a:ext cx="10748160" cy="498960"/>
           </a:xfrm>
           <a:prstGeom prst="rect">
             <a:avLst/>
@@ -19830,7 +19956,7 @@
         <p:spPr>
           <a:xfrm>
             <a:off x="263520" y="6411600"/>
-            <a:ext cx="9975960" cy="245160"/>
+            <a:ext cx="9975600" cy="245160"/>
           </a:xfrm>
           <a:prstGeom prst="rect">
             <a:avLst/>
@@ -19900,7 +20026,7 @@
         <p:spPr>
           <a:xfrm>
             <a:off x="1463040" y="1371600"/>
-            <a:ext cx="8631000" cy="4941720"/>
+            <a:ext cx="8630640" cy="4941360"/>
           </a:xfrm>
           <a:prstGeom prst="rect">
             <a:avLst/>
@@ -19949,7 +20075,7 @@
         <p:spPr>
           <a:xfrm>
             <a:off x="335520" y="764640"/>
-            <a:ext cx="10748520" cy="499320"/>
+            <a:ext cx="10748160" cy="498960"/>
           </a:xfrm>
           <a:prstGeom prst="rect">
             <a:avLst/>
@@ -20003,7 +20129,7 @@
         <p:spPr>
           <a:xfrm>
             <a:off x="263520" y="6411600"/>
-            <a:ext cx="7252200" cy="226800"/>
+            <a:ext cx="7251840" cy="226800"/>
           </a:xfrm>
           <a:prstGeom prst="rect">
             <a:avLst/>

</xml_diff>